<commit_message>
Final presenations, as seen at CodeStock 2013.
</commit_message>
<xml_diff>
--- a/ASPNETMVCInTheCloudWithAppHarbor/Presentation.pptx
+++ b/ASPNETMVCInTheCloudWithAppHarbor/Presentation.pptx
@@ -17,11 +17,12 @@
     <p:sldId id="281" r:id="rId11"/>
     <p:sldId id="282" r:id="rId12"/>
     <p:sldId id="283" r:id="rId13"/>
-    <p:sldId id="284" r:id="rId14"/>
+    <p:sldId id="294" r:id="rId14"/>
     <p:sldId id="287" r:id="rId15"/>
-    <p:sldId id="293" r:id="rId16"/>
-    <p:sldId id="290" r:id="rId17"/>
-    <p:sldId id="288" r:id="rId18"/>
+    <p:sldId id="296" r:id="rId16"/>
+    <p:sldId id="293" r:id="rId17"/>
+    <p:sldId id="290" r:id="rId18"/>
+    <p:sldId id="288" r:id="rId19"/>
   </p:sldIdLst>
   <p:sldSz cx="9144000" cy="6858000" type="screen4x3"/>
   <p:notesSz cx="6858000" cy="9144000"/>
@@ -122,7 +123,7 @@
   </p:defaultTextStyle>
   <p:extLst>
     <p:ext uri="{EFAFB233-063F-42B5-8137-9DF3F51BA10A}">
-      <p15:sldGuideLst xmlns:p15="http://schemas.microsoft.com/office/powerpoint/2012/main">
+      <p15:sldGuideLst xmlns="" xmlns:p15="http://schemas.microsoft.com/office/powerpoint/2012/main">
         <p15:guide id="1" orient="horz" pos="2160">
           <p15:clr>
             <a:srgbClr val="A4A3A4"/>
@@ -5562,48 +5563,48 @@
     </dgm:pt>
   </dgm:ptLst>
   <dgm:cxnLst>
-    <dgm:cxn modelId="{F5DB9A92-2F92-4FC2-9D6E-D2CF591E1AE6}" type="presOf" srcId="{CE3B71B6-A42E-45CC-AB86-F510DD7FF975}" destId="{EDDAB7E8-029C-4936-BD48-1CCEC43FAD1F}" srcOrd="0" destOrd="0" presId="urn:microsoft.com/office/officeart/2005/8/layout/process3"/>
-    <dgm:cxn modelId="{9B56B768-DEAE-4CB4-9B5A-83035C0B5EE8}" type="presOf" srcId="{0B0839D6-BB11-4624-92CF-CBE826C2DDFD}" destId="{2AAD56A9-AF00-4076-BF5A-FE869AA5D420}" srcOrd="0" destOrd="1" presId="urn:microsoft.com/office/officeart/2005/8/layout/process3"/>
-    <dgm:cxn modelId="{4F4E3125-1ABC-4AF7-80E7-ABC93DD1C4C7}" type="presOf" srcId="{F8B91E75-6A34-4088-8D7F-D0293CE19959}" destId="{49D01CFE-9301-49D2-86D9-1F8D392D545E}" srcOrd="1" destOrd="0" presId="urn:microsoft.com/office/officeart/2005/8/layout/process3"/>
+    <dgm:cxn modelId="{084464A8-857A-4265-9C86-F41AE6F43EBD}" type="presOf" srcId="{1237457D-E389-40B3-9058-69171BF06F59}" destId="{05376F09-9BEB-4F27-9B6C-036B7228F902}" srcOrd="0" destOrd="0" presId="urn:microsoft.com/office/officeart/2005/8/layout/process3"/>
     <dgm:cxn modelId="{7E4B5977-D1AE-4CD9-8875-BDD87E1CF87F}" srcId="{DFDD4D9A-CEA3-4778-9CF5-26871A9A42EE}" destId="{BFA00474-5BDC-4816-991E-EE9F94D2E741}" srcOrd="1" destOrd="0" parTransId="{E056D363-140E-4EE4-B77A-9B8CF1C54C0A}" sibTransId="{4C6D5DC8-8EB3-4861-9868-6634FE11D10B}"/>
-    <dgm:cxn modelId="{1136D0D8-5A1F-4D58-B0B0-FC0CD937F9EE}" type="presOf" srcId="{DFDD4D9A-CEA3-4778-9CF5-26871A9A42EE}" destId="{F1A76991-21D5-42EE-9DC6-7402F037AF90}" srcOrd="1" destOrd="0" presId="urn:microsoft.com/office/officeart/2005/8/layout/process3"/>
-    <dgm:cxn modelId="{DD2A5945-60B8-4209-A65B-65A5C1134B14}" type="presOf" srcId="{8E67C3B1-1248-4844-BCB8-27E0A6DC14F9}" destId="{F3D53A18-394F-4C65-87BC-59C81DCDA127}" srcOrd="0" destOrd="1" presId="urn:microsoft.com/office/officeart/2005/8/layout/process3"/>
+    <dgm:cxn modelId="{0CCB6183-C798-40F3-B5B4-7F782E6E2C7A}" type="presOf" srcId="{D44E9308-FB83-4534-81E1-5E284FF2E52B}" destId="{05F887FA-9FEC-4693-A8FF-BE2C54FF4940}" srcOrd="0" destOrd="0" presId="urn:microsoft.com/office/officeart/2005/8/layout/process3"/>
+    <dgm:cxn modelId="{E9E68FF9-856D-43C8-9778-F9E31FD118F4}" type="presOf" srcId="{DFDD4D9A-CEA3-4778-9CF5-26871A9A42EE}" destId="{F1A76991-21D5-42EE-9DC6-7402F037AF90}" srcOrd="1" destOrd="0" presId="urn:microsoft.com/office/officeart/2005/8/layout/process3"/>
+    <dgm:cxn modelId="{97D6CFAC-C129-4592-BE49-50D118DDC0C2}" type="presOf" srcId="{DFDD4D9A-CEA3-4778-9CF5-26871A9A42EE}" destId="{B1A2F4F3-D418-4B45-9AEF-00D0EDDDEBCD}" srcOrd="0" destOrd="0" presId="urn:microsoft.com/office/officeart/2005/8/layout/process3"/>
+    <dgm:cxn modelId="{1EACA8F0-5D62-45FE-A96A-35BFD0E1F633}" type="presOf" srcId="{F8B91E75-6A34-4088-8D7F-D0293CE19959}" destId="{49D01CFE-9301-49D2-86D9-1F8D392D545E}" srcOrd="1" destOrd="0" presId="urn:microsoft.com/office/officeart/2005/8/layout/process3"/>
+    <dgm:cxn modelId="{D36BEB6B-0D45-43C9-80EE-2AB63F2E96A9}" type="presOf" srcId="{3D6D0C63-70C3-400F-B9E9-85ED8A67FA64}" destId="{6DA0FD96-C016-49FC-AD2D-2EBC9440AE1D}" srcOrd="0" destOrd="0" presId="urn:microsoft.com/office/officeart/2005/8/layout/process3"/>
     <dgm:cxn modelId="{D7F9C058-D20A-4A43-A32E-315479EBD8F7}" srcId="{3D6D0C63-70C3-400F-B9E9-85ED8A67FA64}" destId="{057DCC18-763A-4617-BE3E-8A8A5D5BAC96}" srcOrd="0" destOrd="0" parTransId="{81413B75-9DC6-47F5-99AD-6271C04E55C9}" sibTransId="{2E01CA7D-3605-4C00-B7BC-603187B44488}"/>
-    <dgm:cxn modelId="{90CD438A-CCD0-4CB8-A394-EC99A3FD30E7}" type="presOf" srcId="{3D6D0C63-70C3-400F-B9E9-85ED8A67FA64}" destId="{6DA0FD96-C016-49FC-AD2D-2EBC9440AE1D}" srcOrd="0" destOrd="0" presId="urn:microsoft.com/office/officeart/2005/8/layout/process3"/>
+    <dgm:cxn modelId="{4653D165-44B9-4019-8B61-5C20063A9DB7}" type="presOf" srcId="{BFA00474-5BDC-4816-991E-EE9F94D2E741}" destId="{06E92CB4-C14C-4BDC-8243-F32C02F88662}" srcOrd="0" destOrd="1" presId="urn:microsoft.com/office/officeart/2005/8/layout/process3"/>
     <dgm:cxn modelId="{C2929FB8-6FE0-4378-B52A-EF435BC1BDC7}" srcId="{DFDD4D9A-CEA3-4778-9CF5-26871A9A42EE}" destId="{0A9A86FE-71EA-4D6A-9804-0B4BC5D3C42D}" srcOrd="0" destOrd="0" parTransId="{3BBEF012-D5B9-4B29-8841-4CA8A1CD4973}" sibTransId="{E924027A-5FFE-4DDD-BB0F-F02C5BB0C648}"/>
-    <dgm:cxn modelId="{B7611E50-B2C5-441D-AE00-46FDC71AF823}" type="presOf" srcId="{057DCC18-763A-4617-BE3E-8A8A5D5BAC96}" destId="{F3D53A18-394F-4C65-87BC-59C81DCDA127}" srcOrd="0" destOrd="0" presId="urn:microsoft.com/office/officeart/2005/8/layout/process3"/>
-    <dgm:cxn modelId="{51FD8E1A-A451-4B46-8E4B-721D3E0DD7C5}" type="presOf" srcId="{3D6D0C63-70C3-400F-B9E9-85ED8A67FA64}" destId="{B38DC0B1-20D7-42F4-88FB-AA292174EC01}" srcOrd="1" destOrd="0" presId="urn:microsoft.com/office/officeart/2005/8/layout/process3"/>
-    <dgm:cxn modelId="{DA45CAAC-A560-400D-B33A-1A85F7A0E8B9}" type="presOf" srcId="{BFA00474-5BDC-4816-991E-EE9F94D2E741}" destId="{06E92CB4-C14C-4BDC-8243-F32C02F88662}" srcOrd="0" destOrd="1" presId="urn:microsoft.com/office/officeart/2005/8/layout/process3"/>
+    <dgm:cxn modelId="{869700E4-5CA5-4454-976E-E64CB1585543}" type="presOf" srcId="{F8B91E75-6A34-4088-8D7F-D0293CE19959}" destId="{EF49DC8D-0D6E-4426-BA16-0E05F950446E}" srcOrd="0" destOrd="0" presId="urn:microsoft.com/office/officeart/2005/8/layout/process3"/>
+    <dgm:cxn modelId="{7A246846-E746-4C45-9C5E-43B1156F5500}" type="presOf" srcId="{D9896909-B80F-42FB-85ED-572F0F189B94}" destId="{2AAD56A9-AF00-4076-BF5A-FE869AA5D420}" srcOrd="0" destOrd="0" presId="urn:microsoft.com/office/officeart/2005/8/layout/process3"/>
     <dgm:cxn modelId="{DF50622E-D72E-4C75-9F3C-B712D13F500E}" srcId="{1237457D-E389-40B3-9058-69171BF06F59}" destId="{D44E9308-FB83-4534-81E1-5E284FF2E52B}" srcOrd="1" destOrd="0" parTransId="{B88AF0A9-C315-47AF-B350-6014D4C4C898}" sibTransId="{CE3B71B6-A42E-45CC-AB86-F510DD7FF975}"/>
-    <dgm:cxn modelId="{6E31B880-4643-4162-A448-5F30D19AD0FB}" type="presOf" srcId="{DFDD4D9A-CEA3-4778-9CF5-26871A9A42EE}" destId="{B1A2F4F3-D418-4B45-9AEF-00D0EDDDEBCD}" srcOrd="0" destOrd="0" presId="urn:microsoft.com/office/officeart/2005/8/layout/process3"/>
-    <dgm:cxn modelId="{24786854-3D56-4592-AD68-E96662800762}" type="presOf" srcId="{0A9A86FE-71EA-4D6A-9804-0B4BC5D3C42D}" destId="{06E92CB4-C14C-4BDC-8243-F32C02F88662}" srcOrd="0" destOrd="0" presId="urn:microsoft.com/office/officeart/2005/8/layout/process3"/>
+    <dgm:cxn modelId="{AA8FC7B0-C5A2-4E6C-BDB4-10256F2FEE68}" type="presOf" srcId="{0B0839D6-BB11-4624-92CF-CBE826C2DDFD}" destId="{2AAD56A9-AF00-4076-BF5A-FE869AA5D420}" srcOrd="0" destOrd="1" presId="urn:microsoft.com/office/officeart/2005/8/layout/process3"/>
+    <dgm:cxn modelId="{D3D53695-9772-484D-9F52-DE8B753D4CFC}" type="presOf" srcId="{CE3B71B6-A42E-45CC-AB86-F510DD7FF975}" destId="{EF7ABE01-5628-4AC9-A091-F8A2096A580F}" srcOrd="1" destOrd="0" presId="urn:microsoft.com/office/officeart/2005/8/layout/process3"/>
+    <dgm:cxn modelId="{85F9F062-8FF6-4638-AF50-5335686FE9EC}" type="presOf" srcId="{0A9A86FE-71EA-4D6A-9804-0B4BC5D3C42D}" destId="{06E92CB4-C14C-4BDC-8243-F32C02F88662}" srcOrd="0" destOrd="0" presId="urn:microsoft.com/office/officeart/2005/8/layout/process3"/>
     <dgm:cxn modelId="{919BA073-A20D-4DCE-BFD6-2DB1896C4C51}" srcId="{3D6D0C63-70C3-400F-B9E9-85ED8A67FA64}" destId="{8E67C3B1-1248-4844-BCB8-27E0A6DC14F9}" srcOrd="1" destOrd="0" parTransId="{27E0E2FE-1D12-4177-9896-37D18BB85085}" sibTransId="{015E3250-E5F4-4269-934D-0D28BC10FA1C}"/>
-    <dgm:cxn modelId="{4FA878BA-E06F-4C59-8212-8590B60B4378}" type="presOf" srcId="{D44E9308-FB83-4534-81E1-5E284FF2E52B}" destId="{05F887FA-9FEC-4693-A8FF-BE2C54FF4940}" srcOrd="0" destOrd="0" presId="urn:microsoft.com/office/officeart/2005/8/layout/process3"/>
-    <dgm:cxn modelId="{568F1BC8-8161-4582-946B-B02194C4F8A3}" type="presOf" srcId="{1237457D-E389-40B3-9058-69171BF06F59}" destId="{05376F09-9BEB-4F27-9B6C-036B7228F902}" srcOrd="0" destOrd="0" presId="urn:microsoft.com/office/officeart/2005/8/layout/process3"/>
-    <dgm:cxn modelId="{A8AFB5DD-BC6E-4399-87E3-F119127E8702}" type="presOf" srcId="{F8B91E75-6A34-4088-8D7F-D0293CE19959}" destId="{EF49DC8D-0D6E-4426-BA16-0E05F950446E}" srcOrd="0" destOrd="0" presId="urn:microsoft.com/office/officeart/2005/8/layout/process3"/>
+    <dgm:cxn modelId="{F307E4A7-CE69-44BF-8C6A-EA64754BAFEC}" type="presOf" srcId="{CE3B71B6-A42E-45CC-AB86-F510DD7FF975}" destId="{EDDAB7E8-029C-4936-BD48-1CCEC43FAD1F}" srcOrd="0" destOrd="0" presId="urn:microsoft.com/office/officeart/2005/8/layout/process3"/>
+    <dgm:cxn modelId="{5EF29B7E-F98A-4456-BCFE-82DE17496689}" type="presOf" srcId="{3D6D0C63-70C3-400F-B9E9-85ED8A67FA64}" destId="{B38DC0B1-20D7-42F4-88FB-AA292174EC01}" srcOrd="1" destOrd="0" presId="urn:microsoft.com/office/officeart/2005/8/layout/process3"/>
+    <dgm:cxn modelId="{7D8AD482-5398-4DD7-8501-4E2B299D6475}" type="presOf" srcId="{D44E9308-FB83-4534-81E1-5E284FF2E52B}" destId="{7FEE7D60-D801-464B-A558-B4A09B7545C9}" srcOrd="1" destOrd="0" presId="urn:microsoft.com/office/officeart/2005/8/layout/process3"/>
     <dgm:cxn modelId="{A7222B73-5F1B-423F-A3FD-39F4D4D324CE}" srcId="{1237457D-E389-40B3-9058-69171BF06F59}" destId="{3D6D0C63-70C3-400F-B9E9-85ED8A67FA64}" srcOrd="2" destOrd="0" parTransId="{782C301D-5DD6-4849-849F-FDD50C41FC43}" sibTransId="{5331F570-44C5-4CB0-A9F4-8A4C3E2005D0}"/>
-    <dgm:cxn modelId="{3E947FC0-B3CE-48B7-B29C-8111F79F6CE5}" type="presOf" srcId="{D44E9308-FB83-4534-81E1-5E284FF2E52B}" destId="{7FEE7D60-D801-464B-A558-B4A09B7545C9}" srcOrd="1" destOrd="0" presId="urn:microsoft.com/office/officeart/2005/8/layout/process3"/>
-    <dgm:cxn modelId="{ECF2313F-F91E-430A-A26E-B245360323FA}" type="presOf" srcId="{D9896909-B80F-42FB-85ED-572F0F189B94}" destId="{2AAD56A9-AF00-4076-BF5A-FE869AA5D420}" srcOrd="0" destOrd="0" presId="urn:microsoft.com/office/officeart/2005/8/layout/process3"/>
+    <dgm:cxn modelId="{F2BA43F4-E473-42B5-8E3D-880308963ECA}" type="presOf" srcId="{057DCC18-763A-4617-BE3E-8A8A5D5BAC96}" destId="{F3D53A18-394F-4C65-87BC-59C81DCDA127}" srcOrd="0" destOrd="0" presId="urn:microsoft.com/office/officeart/2005/8/layout/process3"/>
+    <dgm:cxn modelId="{2C1C6B94-E395-47F2-A60F-71073AC87F6C}" type="presOf" srcId="{8E67C3B1-1248-4844-BCB8-27E0A6DC14F9}" destId="{F3D53A18-394F-4C65-87BC-59C81DCDA127}" srcOrd="0" destOrd="1" presId="urn:microsoft.com/office/officeart/2005/8/layout/process3"/>
     <dgm:cxn modelId="{ACCD26F1-561F-4C92-9C0A-69309D65CD31}" srcId="{D44E9308-FB83-4534-81E1-5E284FF2E52B}" destId="{0B0839D6-BB11-4624-92CF-CBE826C2DDFD}" srcOrd="1" destOrd="0" parTransId="{6B5DC1E5-5308-48CD-9075-90D6A964C519}" sibTransId="{4602EA7B-7E70-4A17-A64D-B04B88B3C597}"/>
-    <dgm:cxn modelId="{2D8592A0-4226-449A-8256-EBCE11F3BE04}" type="presOf" srcId="{CE3B71B6-A42E-45CC-AB86-F510DD7FF975}" destId="{EF7ABE01-5628-4AC9-A091-F8A2096A580F}" srcOrd="1" destOrd="0" presId="urn:microsoft.com/office/officeart/2005/8/layout/process3"/>
     <dgm:cxn modelId="{234AF1FA-00B6-45A5-84EA-C0E7C65DE2D8}" srcId="{D44E9308-FB83-4534-81E1-5E284FF2E52B}" destId="{D9896909-B80F-42FB-85ED-572F0F189B94}" srcOrd="0" destOrd="0" parTransId="{89581046-27F1-4952-8586-EDD00349823B}" sibTransId="{B0F217F6-1160-4204-9B17-12AA9A96757E}"/>
     <dgm:cxn modelId="{41B7137E-4F3D-4512-B0D3-D622C7A9CEF7}" srcId="{1237457D-E389-40B3-9058-69171BF06F59}" destId="{DFDD4D9A-CEA3-4778-9CF5-26871A9A42EE}" srcOrd="0" destOrd="0" parTransId="{C2F03016-3842-4AAB-B367-C3ECEFAB5338}" sibTransId="{F8B91E75-6A34-4088-8D7F-D0293CE19959}"/>
-    <dgm:cxn modelId="{756EEA6E-FBF5-413F-9FF0-1ED1A2CC38D3}" type="presParOf" srcId="{05376F09-9BEB-4F27-9B6C-036B7228F902}" destId="{A7E2DBF4-252D-49AF-9891-ED7C81E3DC97}" srcOrd="0" destOrd="0" presId="urn:microsoft.com/office/officeart/2005/8/layout/process3"/>
-    <dgm:cxn modelId="{7A3B0291-841A-4ACF-9EB0-564398A99133}" type="presParOf" srcId="{A7E2DBF4-252D-49AF-9891-ED7C81E3DC97}" destId="{B1A2F4F3-D418-4B45-9AEF-00D0EDDDEBCD}" srcOrd="0" destOrd="0" presId="urn:microsoft.com/office/officeart/2005/8/layout/process3"/>
-    <dgm:cxn modelId="{6122235B-0030-4264-9D7D-1395FB13D008}" type="presParOf" srcId="{A7E2DBF4-252D-49AF-9891-ED7C81E3DC97}" destId="{F1A76991-21D5-42EE-9DC6-7402F037AF90}" srcOrd="1" destOrd="0" presId="urn:microsoft.com/office/officeart/2005/8/layout/process3"/>
-    <dgm:cxn modelId="{B768F419-8A04-43B2-8D28-A31AAFE198DE}" type="presParOf" srcId="{A7E2DBF4-252D-49AF-9891-ED7C81E3DC97}" destId="{06E92CB4-C14C-4BDC-8243-F32C02F88662}" srcOrd="2" destOrd="0" presId="urn:microsoft.com/office/officeart/2005/8/layout/process3"/>
-    <dgm:cxn modelId="{F01ED5DE-BA8A-49A8-A6FA-19BC08B65337}" type="presParOf" srcId="{05376F09-9BEB-4F27-9B6C-036B7228F902}" destId="{EF49DC8D-0D6E-4426-BA16-0E05F950446E}" srcOrd="1" destOrd="0" presId="urn:microsoft.com/office/officeart/2005/8/layout/process3"/>
-    <dgm:cxn modelId="{A355715E-0A80-4BE2-9170-2096FD94263C}" type="presParOf" srcId="{EF49DC8D-0D6E-4426-BA16-0E05F950446E}" destId="{49D01CFE-9301-49D2-86D9-1F8D392D545E}" srcOrd="0" destOrd="0" presId="urn:microsoft.com/office/officeart/2005/8/layout/process3"/>
-    <dgm:cxn modelId="{340520AD-243A-41F5-AD49-7C26A58B0DBA}" type="presParOf" srcId="{05376F09-9BEB-4F27-9B6C-036B7228F902}" destId="{04BC21DC-D02B-4C05-88D8-CB15AB7A352E}" srcOrd="2" destOrd="0" presId="urn:microsoft.com/office/officeart/2005/8/layout/process3"/>
-    <dgm:cxn modelId="{244EC8A3-E96A-4F14-9F77-6EFC3F12E85C}" type="presParOf" srcId="{04BC21DC-D02B-4C05-88D8-CB15AB7A352E}" destId="{05F887FA-9FEC-4693-A8FF-BE2C54FF4940}" srcOrd="0" destOrd="0" presId="urn:microsoft.com/office/officeart/2005/8/layout/process3"/>
-    <dgm:cxn modelId="{6CA6988A-5767-4AAD-B21C-1572424639F9}" type="presParOf" srcId="{04BC21DC-D02B-4C05-88D8-CB15AB7A352E}" destId="{7FEE7D60-D801-464B-A558-B4A09B7545C9}" srcOrd="1" destOrd="0" presId="urn:microsoft.com/office/officeart/2005/8/layout/process3"/>
-    <dgm:cxn modelId="{56298F77-BB1E-4587-BE60-FAFFA96D3532}" type="presParOf" srcId="{04BC21DC-D02B-4C05-88D8-CB15AB7A352E}" destId="{2AAD56A9-AF00-4076-BF5A-FE869AA5D420}" srcOrd="2" destOrd="0" presId="urn:microsoft.com/office/officeart/2005/8/layout/process3"/>
-    <dgm:cxn modelId="{878D9C4F-8750-464D-A83B-1AE4755C8C7E}" type="presParOf" srcId="{05376F09-9BEB-4F27-9B6C-036B7228F902}" destId="{EDDAB7E8-029C-4936-BD48-1CCEC43FAD1F}" srcOrd="3" destOrd="0" presId="urn:microsoft.com/office/officeart/2005/8/layout/process3"/>
-    <dgm:cxn modelId="{EC5F1D9B-458F-40DD-8344-34022B5F0798}" type="presParOf" srcId="{EDDAB7E8-029C-4936-BD48-1CCEC43FAD1F}" destId="{EF7ABE01-5628-4AC9-A091-F8A2096A580F}" srcOrd="0" destOrd="0" presId="urn:microsoft.com/office/officeart/2005/8/layout/process3"/>
-    <dgm:cxn modelId="{318CAEB3-CC1F-4677-ADC2-D2F34D811ADC}" type="presParOf" srcId="{05376F09-9BEB-4F27-9B6C-036B7228F902}" destId="{83F186B5-0736-4BAB-AA0E-24C357B3AA83}" srcOrd="4" destOrd="0" presId="urn:microsoft.com/office/officeart/2005/8/layout/process3"/>
-    <dgm:cxn modelId="{1514D6AF-04F9-4BCC-886B-3185F7D00366}" type="presParOf" srcId="{83F186B5-0736-4BAB-AA0E-24C357B3AA83}" destId="{6DA0FD96-C016-49FC-AD2D-2EBC9440AE1D}" srcOrd="0" destOrd="0" presId="urn:microsoft.com/office/officeart/2005/8/layout/process3"/>
-    <dgm:cxn modelId="{CE4FD328-661A-4AAD-AD7F-DB87A9560EA8}" type="presParOf" srcId="{83F186B5-0736-4BAB-AA0E-24C357B3AA83}" destId="{B38DC0B1-20D7-42F4-88FB-AA292174EC01}" srcOrd="1" destOrd="0" presId="urn:microsoft.com/office/officeart/2005/8/layout/process3"/>
-    <dgm:cxn modelId="{3141E23C-1763-496A-82F1-74E1AD26354E}" type="presParOf" srcId="{83F186B5-0736-4BAB-AA0E-24C357B3AA83}" destId="{F3D53A18-394F-4C65-87BC-59C81DCDA127}" srcOrd="2" destOrd="0" presId="urn:microsoft.com/office/officeart/2005/8/layout/process3"/>
+    <dgm:cxn modelId="{1404E371-A2B3-4549-A487-9C1CCC1BB4FF}" type="presParOf" srcId="{05376F09-9BEB-4F27-9B6C-036B7228F902}" destId="{A7E2DBF4-252D-49AF-9891-ED7C81E3DC97}" srcOrd="0" destOrd="0" presId="urn:microsoft.com/office/officeart/2005/8/layout/process3"/>
+    <dgm:cxn modelId="{CDA45B95-A099-464A-8557-98DBFA64C883}" type="presParOf" srcId="{A7E2DBF4-252D-49AF-9891-ED7C81E3DC97}" destId="{B1A2F4F3-D418-4B45-9AEF-00D0EDDDEBCD}" srcOrd="0" destOrd="0" presId="urn:microsoft.com/office/officeart/2005/8/layout/process3"/>
+    <dgm:cxn modelId="{064E6EAD-84A0-4381-B26D-69D4DB1AE490}" type="presParOf" srcId="{A7E2DBF4-252D-49AF-9891-ED7C81E3DC97}" destId="{F1A76991-21D5-42EE-9DC6-7402F037AF90}" srcOrd="1" destOrd="0" presId="urn:microsoft.com/office/officeart/2005/8/layout/process3"/>
+    <dgm:cxn modelId="{03C15ABC-2223-4E6D-BE40-191BA9847F55}" type="presParOf" srcId="{A7E2DBF4-252D-49AF-9891-ED7C81E3DC97}" destId="{06E92CB4-C14C-4BDC-8243-F32C02F88662}" srcOrd="2" destOrd="0" presId="urn:microsoft.com/office/officeart/2005/8/layout/process3"/>
+    <dgm:cxn modelId="{B1BBD45E-FC91-468B-B920-1334484366A2}" type="presParOf" srcId="{05376F09-9BEB-4F27-9B6C-036B7228F902}" destId="{EF49DC8D-0D6E-4426-BA16-0E05F950446E}" srcOrd="1" destOrd="0" presId="urn:microsoft.com/office/officeart/2005/8/layout/process3"/>
+    <dgm:cxn modelId="{80D8143C-A6F5-40DA-AC2B-AC744BC7DA22}" type="presParOf" srcId="{EF49DC8D-0D6E-4426-BA16-0E05F950446E}" destId="{49D01CFE-9301-49D2-86D9-1F8D392D545E}" srcOrd="0" destOrd="0" presId="urn:microsoft.com/office/officeart/2005/8/layout/process3"/>
+    <dgm:cxn modelId="{A11E3FC4-66AE-4367-97B2-54AEF1334D2D}" type="presParOf" srcId="{05376F09-9BEB-4F27-9B6C-036B7228F902}" destId="{04BC21DC-D02B-4C05-88D8-CB15AB7A352E}" srcOrd="2" destOrd="0" presId="urn:microsoft.com/office/officeart/2005/8/layout/process3"/>
+    <dgm:cxn modelId="{DE97CDB1-0855-4C5E-8EC8-BC52D931AE2F}" type="presParOf" srcId="{04BC21DC-D02B-4C05-88D8-CB15AB7A352E}" destId="{05F887FA-9FEC-4693-A8FF-BE2C54FF4940}" srcOrd="0" destOrd="0" presId="urn:microsoft.com/office/officeart/2005/8/layout/process3"/>
+    <dgm:cxn modelId="{B47E14D4-D773-4B8F-8F0E-0A7C15B0CFB6}" type="presParOf" srcId="{04BC21DC-D02B-4C05-88D8-CB15AB7A352E}" destId="{7FEE7D60-D801-464B-A558-B4A09B7545C9}" srcOrd="1" destOrd="0" presId="urn:microsoft.com/office/officeart/2005/8/layout/process3"/>
+    <dgm:cxn modelId="{2ADE240A-CA3D-422A-B0F2-3B0A105375E3}" type="presParOf" srcId="{04BC21DC-D02B-4C05-88D8-CB15AB7A352E}" destId="{2AAD56A9-AF00-4076-BF5A-FE869AA5D420}" srcOrd="2" destOrd="0" presId="urn:microsoft.com/office/officeart/2005/8/layout/process3"/>
+    <dgm:cxn modelId="{A676C873-59A0-4CCC-BFA3-2BAFDFF0F747}" type="presParOf" srcId="{05376F09-9BEB-4F27-9B6C-036B7228F902}" destId="{EDDAB7E8-029C-4936-BD48-1CCEC43FAD1F}" srcOrd="3" destOrd="0" presId="urn:microsoft.com/office/officeart/2005/8/layout/process3"/>
+    <dgm:cxn modelId="{4168BAC9-7AA6-44CD-AC41-C18839A08D11}" type="presParOf" srcId="{EDDAB7E8-029C-4936-BD48-1CCEC43FAD1F}" destId="{EF7ABE01-5628-4AC9-A091-F8A2096A580F}" srcOrd="0" destOrd="0" presId="urn:microsoft.com/office/officeart/2005/8/layout/process3"/>
+    <dgm:cxn modelId="{B277031B-F05A-4105-8936-8ABFF39FC9A2}" type="presParOf" srcId="{05376F09-9BEB-4F27-9B6C-036B7228F902}" destId="{83F186B5-0736-4BAB-AA0E-24C357B3AA83}" srcOrd="4" destOrd="0" presId="urn:microsoft.com/office/officeart/2005/8/layout/process3"/>
+    <dgm:cxn modelId="{1730DD6C-E7E4-49BA-A954-DD675E84BD0E}" type="presParOf" srcId="{83F186B5-0736-4BAB-AA0E-24C357B3AA83}" destId="{6DA0FD96-C016-49FC-AD2D-2EBC9440AE1D}" srcOrd="0" destOrd="0" presId="urn:microsoft.com/office/officeart/2005/8/layout/process3"/>
+    <dgm:cxn modelId="{39849B9B-2AC9-4D57-8CFD-D27DA8356741}" type="presParOf" srcId="{83F186B5-0736-4BAB-AA0E-24C357B3AA83}" destId="{B38DC0B1-20D7-42F4-88FB-AA292174EC01}" srcOrd="1" destOrd="0" presId="urn:microsoft.com/office/officeart/2005/8/layout/process3"/>
+    <dgm:cxn modelId="{3AE3694D-CF16-4E8E-A1E9-CBCAB54E7C2D}" type="presParOf" srcId="{83F186B5-0736-4BAB-AA0E-24C357B3AA83}" destId="{F3D53A18-394F-4C65-87BC-59C81DCDA127}" srcOrd="2" destOrd="0" presId="urn:microsoft.com/office/officeart/2005/8/layout/process3"/>
   </dgm:cxnLst>
   <dgm:bg/>
   <dgm:whole/>
@@ -6402,32 +6403,32 @@
     </dgm:pt>
   </dgm:ptLst>
   <dgm:cxnLst>
+    <dgm:cxn modelId="{1E0D0CC5-E8DD-40A2-8F0A-18D11EECFFB1}" type="presOf" srcId="{2B61C45F-65DF-4EAE-84EF-1853C01F54D4}" destId="{3F29C509-0905-469B-8D4F-490E50E17632}" srcOrd="0" destOrd="0" presId="urn:microsoft.com/office/officeart/2005/8/layout/list1"/>
+    <dgm:cxn modelId="{550BEA69-26BF-4BC2-8807-C0150C9D08A3}" type="presOf" srcId="{C72F6078-F3ED-4240-A325-64EA9924FADD}" destId="{ECDE182A-1734-4C91-8980-87BB6EEB88CE}" srcOrd="1" destOrd="0" presId="urn:microsoft.com/office/officeart/2005/8/layout/list1"/>
+    <dgm:cxn modelId="{2A15886E-C7B3-44CE-B9AD-EEEC96C312DC}" type="presOf" srcId="{620B0646-7D9A-436C-A9FD-81D6A436892A}" destId="{CB51B58A-81D3-4499-8725-250CB24C753D}" srcOrd="1" destOrd="0" presId="urn:microsoft.com/office/officeart/2005/8/layout/list1"/>
+    <dgm:cxn modelId="{41B7137E-4F3D-4512-B0D3-D622C7A9CEF7}" srcId="{1237457D-E389-40B3-9058-69171BF06F59}" destId="{DFDD4D9A-CEA3-4778-9CF5-26871A9A42EE}" srcOrd="0" destOrd="0" parTransId="{C2F03016-3842-4AAB-B367-C3ECEFAB5338}" sibTransId="{F8B91E75-6A34-4088-8D7F-D0293CE19959}"/>
+    <dgm:cxn modelId="{3DC696DC-830D-4409-A965-56D2A37B5B99}" srcId="{1237457D-E389-40B3-9058-69171BF06F59}" destId="{C9211C86-558A-4D90-9C3E-6C1A65962D79}" srcOrd="1" destOrd="0" parTransId="{FD3CC43B-BE0F-4599-8184-F353EFC8AC8B}" sibTransId="{F11328B9-0DAB-44B6-AD29-966DAC1787D5}"/>
+    <dgm:cxn modelId="{7F0B919C-EB9E-42D3-9C03-BF0FB712A6BE}" type="presOf" srcId="{1237457D-E389-40B3-9058-69171BF06F59}" destId="{F232CB17-EE66-4ED8-B470-9A83569A5914}" srcOrd="0" destOrd="0" presId="urn:microsoft.com/office/officeart/2005/8/layout/list1"/>
+    <dgm:cxn modelId="{53E927D3-6C05-4364-9010-B95ED2C0F7AF}" type="presOf" srcId="{DFDD4D9A-CEA3-4778-9CF5-26871A9A42EE}" destId="{8365E5CE-E84E-4955-9FD3-D03D62C20D36}" srcOrd="1" destOrd="0" presId="urn:microsoft.com/office/officeart/2005/8/layout/list1"/>
+    <dgm:cxn modelId="{5FE6AE26-5D12-453E-BAD3-B9B860586030}" srcId="{1237457D-E389-40B3-9058-69171BF06F59}" destId="{5D51BA86-8CBB-4242-9E67-B4A36CFB6BD4}" srcOrd="2" destOrd="0" parTransId="{32C0FD73-EC92-4E4B-9151-185BDDF49858}" sibTransId="{CB2D13D0-2528-4A4A-8796-CB2667AAD9BE}"/>
     <dgm:cxn modelId="{76A4FFB4-CAB7-4EB0-AE07-EECF2AC5329A}" srcId="{1237457D-E389-40B3-9058-69171BF06F59}" destId="{C72F6078-F3ED-4240-A325-64EA9924FADD}" srcOrd="3" destOrd="0" parTransId="{398D0DE5-C2BE-4147-BC00-ACFCE0878A7E}" sibTransId="{5844BC37-AD0F-4E07-939C-ACB2455BB20F}"/>
+    <dgm:cxn modelId="{7B790A76-770C-46A9-9E09-6321FE159F16}" type="presOf" srcId="{DFDD4D9A-CEA3-4778-9CF5-26871A9A42EE}" destId="{778EAE27-93D3-4C1A-AEA6-73CBF0832400}" srcOrd="0" destOrd="0" presId="urn:microsoft.com/office/officeart/2005/8/layout/list1"/>
+    <dgm:cxn modelId="{DEEE1A0B-0E21-4AB8-A8D4-5DD77FD13085}" type="presOf" srcId="{5D51BA86-8CBB-4242-9E67-B4A36CFB6BD4}" destId="{8CD870C5-18AE-43D7-9836-176272C63F79}" srcOrd="0" destOrd="0" presId="urn:microsoft.com/office/officeart/2005/8/layout/list1"/>
+    <dgm:cxn modelId="{D0DE76BA-FE39-47AD-B048-C50D56924CC9}" type="presOf" srcId="{0997098D-448D-43C4-9994-6E35327EAD76}" destId="{BAD6A75C-33A9-4040-A3A7-E7F385AE159C}" srcOrd="0" destOrd="0" presId="urn:microsoft.com/office/officeart/2005/8/layout/list1"/>
+    <dgm:cxn modelId="{91818E27-93AB-4090-A004-4B69A5409F42}" type="presOf" srcId="{9C9D8CDE-B385-4877-938E-4BF913ECD035}" destId="{2E2145C4-0123-4F17-8313-A0974DEC4B4D}" srcOrd="0" destOrd="0" presId="urn:microsoft.com/office/officeart/2005/8/layout/list1"/>
+    <dgm:cxn modelId="{1E24F8A1-D8D8-44BE-869E-59E29F297B7E}" srcId="{C9211C86-558A-4D90-9C3E-6C1A65962D79}" destId="{2B61C45F-65DF-4EAE-84EF-1853C01F54D4}" srcOrd="0" destOrd="0" parTransId="{E8D4F74E-CB9F-4E32-B9E0-DDD2C95F8888}" sibTransId="{5D3E7791-C3B9-4E23-AF08-02686CD0D5F9}"/>
+    <dgm:cxn modelId="{030CCAE6-0EAC-4762-9B5F-87129A1569AE}" type="presOf" srcId="{C9211C86-558A-4D90-9C3E-6C1A65962D79}" destId="{445A0DFC-987B-4628-A42C-F3CA2578BF9F}" srcOrd="1" destOrd="0" presId="urn:microsoft.com/office/officeart/2005/8/layout/list1"/>
+    <dgm:cxn modelId="{9778066A-6824-4E58-8511-45CE278DE9B0}" srcId="{1237457D-E389-40B3-9058-69171BF06F59}" destId="{620B0646-7D9A-436C-A9FD-81D6A436892A}" srcOrd="4" destOrd="0" parTransId="{992CC3C9-F329-43DB-AF25-FC8947B7AF33}" sibTransId="{FDAAE037-CE41-424A-9B9F-1BEA0F3709BE}"/>
+    <dgm:cxn modelId="{2809351D-84F6-4B69-B033-2A9EF6369C91}" type="presOf" srcId="{81E1A0A5-ACE3-4D50-8A2C-5D46B5C5BFE1}" destId="{962EB818-441B-428E-8E97-A6C429D90694}" srcOrd="0" destOrd="0" presId="urn:microsoft.com/office/officeart/2005/8/layout/list1"/>
+    <dgm:cxn modelId="{805746D0-4971-410F-A8B7-7BABADFF7000}" srcId="{DFDD4D9A-CEA3-4778-9CF5-26871A9A42EE}" destId="{0997098D-448D-43C4-9994-6E35327EAD76}" srcOrd="0" destOrd="0" parTransId="{0B12D109-912A-4001-B333-F82C328100DC}" sibTransId="{5C59CBB9-DD80-447D-AF2D-B8B67A6239D6}"/>
     <dgm:cxn modelId="{6285820F-77A6-4068-A1DF-F79CF21A2B9B}" srcId="{5D51BA86-8CBB-4242-9E67-B4A36CFB6BD4}" destId="{9C9D8CDE-B385-4877-938E-4BF913ECD035}" srcOrd="0" destOrd="0" parTransId="{C8D2C6F1-21AA-4C44-AACB-1F9963F9CAFA}" sibTransId="{B3F1DD1A-F822-4217-B26B-5EABB8F6279B}"/>
-    <dgm:cxn modelId="{550BEA69-26BF-4BC2-8807-C0150C9D08A3}" type="presOf" srcId="{C72F6078-F3ED-4240-A325-64EA9924FADD}" destId="{ECDE182A-1734-4C91-8980-87BB6EEB88CE}" srcOrd="1" destOrd="0" presId="urn:microsoft.com/office/officeart/2005/8/layout/list1"/>
-    <dgm:cxn modelId="{1E0D0CC5-E8DD-40A2-8F0A-18D11EECFFB1}" type="presOf" srcId="{2B61C45F-65DF-4EAE-84EF-1853C01F54D4}" destId="{3F29C509-0905-469B-8D4F-490E50E17632}" srcOrd="0" destOrd="0" presId="urn:microsoft.com/office/officeart/2005/8/layout/list1"/>
-    <dgm:cxn modelId="{3DC696DC-830D-4409-A965-56D2A37B5B99}" srcId="{1237457D-E389-40B3-9058-69171BF06F59}" destId="{C9211C86-558A-4D90-9C3E-6C1A65962D79}" srcOrd="1" destOrd="0" parTransId="{FD3CC43B-BE0F-4599-8184-F353EFC8AC8B}" sibTransId="{F11328B9-0DAB-44B6-AD29-966DAC1787D5}"/>
+    <dgm:cxn modelId="{FB7B56EB-0172-4A01-968A-B19AFF74C4E7}" type="presOf" srcId="{620B0646-7D9A-436C-A9FD-81D6A436892A}" destId="{5DC83DC6-3A11-487C-A9A5-336E776EFAB8}" srcOrd="0" destOrd="0" presId="urn:microsoft.com/office/officeart/2005/8/layout/list1"/>
+    <dgm:cxn modelId="{36B0AB6E-086C-4A01-B635-9E29CA62BF2E}" srcId="{620B0646-7D9A-436C-A9FD-81D6A436892A}" destId="{81E1A0A5-ACE3-4D50-8A2C-5D46B5C5BFE1}" srcOrd="0" destOrd="0" parTransId="{795EE0D9-A573-45D5-A84D-F110DE8A4840}" sibTransId="{7333EFEC-35EA-4D3C-AD5D-4AF107CDA567}"/>
+    <dgm:cxn modelId="{640CB612-0DC4-4FC2-8709-F925131DFDBB}" type="presOf" srcId="{E77B242B-E671-41F2-9A03-F610DE13AA83}" destId="{687334A3-7CA9-4596-B64C-4F2D7CBBA23D}" srcOrd="0" destOrd="0" presId="urn:microsoft.com/office/officeart/2005/8/layout/list1"/>
     <dgm:cxn modelId="{B7F4FBCB-7C5F-4FA8-B039-56DAC0290DCF}" srcId="{C72F6078-F3ED-4240-A325-64EA9924FADD}" destId="{E77B242B-E671-41F2-9A03-F610DE13AA83}" srcOrd="0" destOrd="0" parTransId="{49D17367-FDAF-4659-9C3B-5F9AE1DEA364}" sibTransId="{2544EF68-37A4-42A8-8601-68116BF0C166}"/>
-    <dgm:cxn modelId="{DEEE1A0B-0E21-4AB8-A8D4-5DD77FD13085}" type="presOf" srcId="{5D51BA86-8CBB-4242-9E67-B4A36CFB6BD4}" destId="{8CD870C5-18AE-43D7-9836-176272C63F79}" srcOrd="0" destOrd="0" presId="urn:microsoft.com/office/officeart/2005/8/layout/list1"/>
-    <dgm:cxn modelId="{41B7137E-4F3D-4512-B0D3-D622C7A9CEF7}" srcId="{1237457D-E389-40B3-9058-69171BF06F59}" destId="{DFDD4D9A-CEA3-4778-9CF5-26871A9A42EE}" srcOrd="0" destOrd="0" parTransId="{C2F03016-3842-4AAB-B367-C3ECEFAB5338}" sibTransId="{F8B91E75-6A34-4088-8D7F-D0293CE19959}"/>
-    <dgm:cxn modelId="{805746D0-4971-410F-A8B7-7BABADFF7000}" srcId="{DFDD4D9A-CEA3-4778-9CF5-26871A9A42EE}" destId="{0997098D-448D-43C4-9994-6E35327EAD76}" srcOrd="0" destOrd="0" parTransId="{0B12D109-912A-4001-B333-F82C328100DC}" sibTransId="{5C59CBB9-DD80-447D-AF2D-B8B67A6239D6}"/>
+    <dgm:cxn modelId="{2A5134F8-821F-4BDF-A276-4B2F32E6716B}" type="presOf" srcId="{5D51BA86-8CBB-4242-9E67-B4A36CFB6BD4}" destId="{AC389A52-A4FE-4C31-83E5-90ECAB9C1030}" srcOrd="1" destOrd="0" presId="urn:microsoft.com/office/officeart/2005/8/layout/list1"/>
+    <dgm:cxn modelId="{A9F5584E-8304-4963-9F39-F2975FA4C1C7}" type="presOf" srcId="{C72F6078-F3ED-4240-A325-64EA9924FADD}" destId="{03F7DF56-715B-4468-B7EF-B971A1457333}" srcOrd="0" destOrd="0" presId="urn:microsoft.com/office/officeart/2005/8/layout/list1"/>
     <dgm:cxn modelId="{DA42EDAA-53EC-43A1-B9A1-E6996D99B94F}" type="presOf" srcId="{C9211C86-558A-4D90-9C3E-6C1A65962D79}" destId="{C793757C-20F3-4945-86C8-6D49721039A5}" srcOrd="0" destOrd="0" presId="urn:microsoft.com/office/officeart/2005/8/layout/list1"/>
-    <dgm:cxn modelId="{2A5134F8-821F-4BDF-A276-4B2F32E6716B}" type="presOf" srcId="{5D51BA86-8CBB-4242-9E67-B4A36CFB6BD4}" destId="{AC389A52-A4FE-4C31-83E5-90ECAB9C1030}" srcOrd="1" destOrd="0" presId="urn:microsoft.com/office/officeart/2005/8/layout/list1"/>
-    <dgm:cxn modelId="{7B790A76-770C-46A9-9E09-6321FE159F16}" type="presOf" srcId="{DFDD4D9A-CEA3-4778-9CF5-26871A9A42EE}" destId="{778EAE27-93D3-4C1A-AEA6-73CBF0832400}" srcOrd="0" destOrd="0" presId="urn:microsoft.com/office/officeart/2005/8/layout/list1"/>
-    <dgm:cxn modelId="{91818E27-93AB-4090-A004-4B69A5409F42}" type="presOf" srcId="{9C9D8CDE-B385-4877-938E-4BF913ECD035}" destId="{2E2145C4-0123-4F17-8313-A0974DEC4B4D}" srcOrd="0" destOrd="0" presId="urn:microsoft.com/office/officeart/2005/8/layout/list1"/>
-    <dgm:cxn modelId="{D0DE76BA-FE39-47AD-B048-C50D56924CC9}" type="presOf" srcId="{0997098D-448D-43C4-9994-6E35327EAD76}" destId="{BAD6A75C-33A9-4040-A3A7-E7F385AE159C}" srcOrd="0" destOrd="0" presId="urn:microsoft.com/office/officeart/2005/8/layout/list1"/>
-    <dgm:cxn modelId="{5FE6AE26-5D12-453E-BAD3-B9B860586030}" srcId="{1237457D-E389-40B3-9058-69171BF06F59}" destId="{5D51BA86-8CBB-4242-9E67-B4A36CFB6BD4}" srcOrd="2" destOrd="0" parTransId="{32C0FD73-EC92-4E4B-9151-185BDDF49858}" sibTransId="{CB2D13D0-2528-4A4A-8796-CB2667AAD9BE}"/>
-    <dgm:cxn modelId="{030CCAE6-0EAC-4762-9B5F-87129A1569AE}" type="presOf" srcId="{C9211C86-558A-4D90-9C3E-6C1A65962D79}" destId="{445A0DFC-987B-4628-A42C-F3CA2578BF9F}" srcOrd="1" destOrd="0" presId="urn:microsoft.com/office/officeart/2005/8/layout/list1"/>
-    <dgm:cxn modelId="{640CB612-0DC4-4FC2-8709-F925131DFDBB}" type="presOf" srcId="{E77B242B-E671-41F2-9A03-F610DE13AA83}" destId="{687334A3-7CA9-4596-B64C-4F2D7CBBA23D}" srcOrd="0" destOrd="0" presId="urn:microsoft.com/office/officeart/2005/8/layout/list1"/>
-    <dgm:cxn modelId="{53E927D3-6C05-4364-9010-B95ED2C0F7AF}" type="presOf" srcId="{DFDD4D9A-CEA3-4778-9CF5-26871A9A42EE}" destId="{8365E5CE-E84E-4955-9FD3-D03D62C20D36}" srcOrd="1" destOrd="0" presId="urn:microsoft.com/office/officeart/2005/8/layout/list1"/>
-    <dgm:cxn modelId="{1E24F8A1-D8D8-44BE-869E-59E29F297B7E}" srcId="{C9211C86-558A-4D90-9C3E-6C1A65962D79}" destId="{2B61C45F-65DF-4EAE-84EF-1853C01F54D4}" srcOrd="0" destOrd="0" parTransId="{E8D4F74E-CB9F-4E32-B9E0-DDD2C95F8888}" sibTransId="{5D3E7791-C3B9-4E23-AF08-02686CD0D5F9}"/>
-    <dgm:cxn modelId="{9778066A-6824-4E58-8511-45CE278DE9B0}" srcId="{1237457D-E389-40B3-9058-69171BF06F59}" destId="{620B0646-7D9A-436C-A9FD-81D6A436892A}" srcOrd="4" destOrd="0" parTransId="{992CC3C9-F329-43DB-AF25-FC8947B7AF33}" sibTransId="{FDAAE037-CE41-424A-9B9F-1BEA0F3709BE}"/>
-    <dgm:cxn modelId="{A9F5584E-8304-4963-9F39-F2975FA4C1C7}" type="presOf" srcId="{C72F6078-F3ED-4240-A325-64EA9924FADD}" destId="{03F7DF56-715B-4468-B7EF-B971A1457333}" srcOrd="0" destOrd="0" presId="urn:microsoft.com/office/officeart/2005/8/layout/list1"/>
-    <dgm:cxn modelId="{2A15886E-C7B3-44CE-B9AD-EEEC96C312DC}" type="presOf" srcId="{620B0646-7D9A-436C-A9FD-81D6A436892A}" destId="{CB51B58A-81D3-4499-8725-250CB24C753D}" srcOrd="1" destOrd="0" presId="urn:microsoft.com/office/officeart/2005/8/layout/list1"/>
-    <dgm:cxn modelId="{36B0AB6E-086C-4A01-B635-9E29CA62BF2E}" srcId="{620B0646-7D9A-436C-A9FD-81D6A436892A}" destId="{81E1A0A5-ACE3-4D50-8A2C-5D46B5C5BFE1}" srcOrd="0" destOrd="0" parTransId="{795EE0D9-A573-45D5-A84D-F110DE8A4840}" sibTransId="{7333EFEC-35EA-4D3C-AD5D-4AF107CDA567}"/>
-    <dgm:cxn modelId="{2809351D-84F6-4B69-B033-2A9EF6369C91}" type="presOf" srcId="{81E1A0A5-ACE3-4D50-8A2C-5D46B5C5BFE1}" destId="{962EB818-441B-428E-8E97-A6C429D90694}" srcOrd="0" destOrd="0" presId="urn:microsoft.com/office/officeart/2005/8/layout/list1"/>
-    <dgm:cxn modelId="{7F0B919C-EB9E-42D3-9C03-BF0FB712A6BE}" type="presOf" srcId="{1237457D-E389-40B3-9058-69171BF06F59}" destId="{F232CB17-EE66-4ED8-B470-9A83569A5914}" srcOrd="0" destOrd="0" presId="urn:microsoft.com/office/officeart/2005/8/layout/list1"/>
-    <dgm:cxn modelId="{FB7B56EB-0172-4A01-968A-B19AFF74C4E7}" type="presOf" srcId="{620B0646-7D9A-436C-A9FD-81D6A436892A}" destId="{5DC83DC6-3A11-487C-A9A5-336E776EFAB8}" srcOrd="0" destOrd="0" presId="urn:microsoft.com/office/officeart/2005/8/layout/list1"/>
     <dgm:cxn modelId="{6C0A6EAD-A5A9-4312-AD85-7ED483BF78DA}" type="presParOf" srcId="{F232CB17-EE66-4ED8-B470-9A83569A5914}" destId="{CC0E4E8A-3867-4E0B-ACFB-696C2C8CB7C0}" srcOrd="0" destOrd="0" presId="urn:microsoft.com/office/officeart/2005/8/layout/list1"/>
     <dgm:cxn modelId="{811E278B-8059-4C5D-BE59-5632F1434DE7}" type="presParOf" srcId="{CC0E4E8A-3867-4E0B-ACFB-696C2C8CB7C0}" destId="{778EAE27-93D3-4C1A-AEA6-73CBF0832400}" srcOrd="0" destOrd="0" presId="urn:microsoft.com/office/officeart/2005/8/layout/list1"/>
     <dgm:cxn modelId="{08D87D32-E498-43A3-93CF-CFBBE5E4CFFA}" type="presParOf" srcId="{CC0E4E8A-3867-4E0B-ACFB-696C2C8CB7C0}" destId="{8365E5CE-E84E-4955-9FD3-D03D62C20D36}" srcOrd="1" destOrd="0" presId="urn:microsoft.com/office/officeart/2005/8/layout/list1"/>
@@ -7769,7 +7770,7 @@
       </dsp:nvSpPr>
       <dsp:spPr>
         <a:xfrm>
-          <a:off x="4093" y="1346650"/>
+          <a:off x="4093" y="965650"/>
           <a:ext cx="1861062" cy="1107392"/>
         </a:xfrm>
         <a:prstGeom prst="roundRect">
@@ -7837,7 +7838,7 @@
         </a:p>
       </dsp:txBody>
       <dsp:txXfrm>
-        <a:off x="4093" y="1346650"/>
+        <a:off x="4093" y="965650"/>
         <a:ext cx="1861062" cy="738261"/>
       </dsp:txXfrm>
     </dsp:sp>
@@ -7848,7 +7849,7 @@
       </dsp:nvSpPr>
       <dsp:spPr>
         <a:xfrm>
-          <a:off x="385274" y="2084912"/>
+          <a:off x="385274" y="1703912"/>
           <a:ext cx="1861062" cy="1094400"/>
         </a:xfrm>
         <a:prstGeom prst="roundRect">
@@ -7935,7 +7936,7 @@
         </a:p>
       </dsp:txBody>
       <dsp:txXfrm>
-        <a:off x="417328" y="2116966"/>
+        <a:off x="417328" y="1735966"/>
         <a:ext cx="1796954" cy="1030292"/>
       </dsp:txXfrm>
     </dsp:sp>
@@ -7946,7 +7947,7 @@
       </dsp:nvSpPr>
       <dsp:spPr>
         <a:xfrm>
-          <a:off x="2147286" y="1484106"/>
+          <a:off x="2147286" y="1103106"/>
           <a:ext cx="598116" cy="463350"/>
         </a:xfrm>
         <a:prstGeom prst="rightArrow">
@@ -8003,7 +8004,7 @@
         </a:p>
       </dsp:txBody>
       <dsp:txXfrm>
-        <a:off x="2147286" y="1576776"/>
+        <a:off x="2147286" y="1195776"/>
         <a:ext cx="459111" cy="278010"/>
       </dsp:txXfrm>
     </dsp:sp>
@@ -8014,7 +8015,7 @@
       </dsp:nvSpPr>
       <dsp:spPr>
         <a:xfrm>
-          <a:off x="2993677" y="1346650"/>
+          <a:off x="2993677" y="965650"/>
           <a:ext cx="1861062" cy="1107392"/>
         </a:xfrm>
         <a:prstGeom prst="roundRect">
@@ -8082,7 +8083,7 @@
         </a:p>
       </dsp:txBody>
       <dsp:txXfrm>
-        <a:off x="2993677" y="1346650"/>
+        <a:off x="2993677" y="965650"/>
         <a:ext cx="1861062" cy="738261"/>
       </dsp:txXfrm>
     </dsp:sp>
@@ -8093,7 +8094,7 @@
       </dsp:nvSpPr>
       <dsp:spPr>
         <a:xfrm>
-          <a:off x="3374859" y="2084912"/>
+          <a:off x="3374859" y="1703912"/>
           <a:ext cx="1861062" cy="1094400"/>
         </a:xfrm>
         <a:prstGeom prst="roundRect">
@@ -8180,7 +8181,7 @@
         </a:p>
       </dsp:txBody>
       <dsp:txXfrm>
-        <a:off x="3406913" y="2116966"/>
+        <a:off x="3406913" y="1735966"/>
         <a:ext cx="1796954" cy="1030292"/>
       </dsp:txXfrm>
     </dsp:sp>
@@ -8191,7 +8192,7 @@
       </dsp:nvSpPr>
       <dsp:spPr>
         <a:xfrm>
-          <a:off x="5136871" y="1484106"/>
+          <a:off x="5136871" y="1103106"/>
           <a:ext cx="598116" cy="463350"/>
         </a:xfrm>
         <a:prstGeom prst="rightArrow">
@@ -8248,7 +8249,7 @@
         </a:p>
       </dsp:txBody>
       <dsp:txXfrm>
-        <a:off x="5136871" y="1576776"/>
+        <a:off x="5136871" y="1195776"/>
         <a:ext cx="459111" cy="278010"/>
       </dsp:txXfrm>
     </dsp:sp>
@@ -8259,7 +8260,7 @@
       </dsp:nvSpPr>
       <dsp:spPr>
         <a:xfrm>
-          <a:off x="5983262" y="1346650"/>
+          <a:off x="5983262" y="965650"/>
           <a:ext cx="1861062" cy="1107392"/>
         </a:xfrm>
         <a:prstGeom prst="roundRect">
@@ -8327,7 +8328,7 @@
         </a:p>
       </dsp:txBody>
       <dsp:txXfrm>
-        <a:off x="5983262" y="1346650"/>
+        <a:off x="5983262" y="965650"/>
         <a:ext cx="1861062" cy="738261"/>
       </dsp:txXfrm>
     </dsp:sp>
@@ -8338,7 +8339,7 @@
       </dsp:nvSpPr>
       <dsp:spPr>
         <a:xfrm>
-          <a:off x="6364443" y="2084912"/>
+          <a:off x="6364443" y="1703912"/>
           <a:ext cx="1861062" cy="1094400"/>
         </a:xfrm>
         <a:prstGeom prst="roundRect">
@@ -8425,7 +8426,7 @@
         </a:p>
       </dsp:txBody>
       <dsp:txXfrm>
-        <a:off x="6396497" y="2116966"/>
+        <a:off x="6396497" y="1735966"/>
         <a:ext cx="1796954" cy="1030292"/>
       </dsp:txXfrm>
     </dsp:sp>
@@ -16220,7 +16221,7 @@
             <a:fld id="{81656523-EAF5-46B7-9B06-020EE63501CA}" type="datetimeFigureOut">
               <a:rPr lang="en-US" smtClean="0"/>
               <a:pPr/>
-              <a:t>7/7/2013</a:t>
+              <a:t>7/12/2013</a:t>
             </a:fld>
             <a:endParaRPr lang="en-US"/>
           </a:p>
@@ -16402,7 +16403,7 @@
             <a:fld id="{08B732E4-6C5A-4594-82D3-8BD15445C4A1}" type="datetimeFigureOut">
               <a:rPr lang="en-US" smtClean="0"/>
               <a:pPr/>
-              <a:t>7/7/2013</a:t>
+              <a:t>7/12/2013</a:t>
             </a:fld>
             <a:endParaRPr lang="en-US"/>
           </a:p>
@@ -16594,7 +16595,7 @@
             <a:fld id="{9C3C59CE-4D55-4C49-9C6F-2B250D39A70E}" type="datetimeFigureOut">
               <a:rPr lang="en-US" smtClean="0"/>
               <a:pPr/>
-              <a:t>7/7/2013</a:t>
+              <a:t>7/12/2013</a:t>
             </a:fld>
             <a:endParaRPr lang="en-US"/>
           </a:p>
@@ -16776,7 +16777,7 @@
             <a:fld id="{1B87C617-8F19-432A-9275-23BE2196BEB5}" type="datetimeFigureOut">
               <a:rPr lang="en-US" smtClean="0"/>
               <a:pPr/>
-              <a:t>7/7/2013</a:t>
+              <a:t>7/12/2013</a:t>
             </a:fld>
             <a:endParaRPr lang="en-US"/>
           </a:p>
@@ -17038,7 +17039,7 @@
                 </a:solidFill>
               </a:rPr>
               <a:pPr/>
-              <a:t>7/7/2013</a:t>
+              <a:t>7/12/2013</a:t>
             </a:fld>
             <a:endParaRPr lang="en-US">
               <a:solidFill>
@@ -17350,7 +17351,7 @@
             <a:fld id="{EBDDE4B9-F741-4019-B85F-E21478F9E119}" type="datetimeFigureOut">
               <a:rPr lang="en-US" smtClean="0"/>
               <a:pPr/>
-              <a:t>7/7/2013</a:t>
+              <a:t>7/12/2013</a:t>
             </a:fld>
             <a:endParaRPr lang="en-US"/>
           </a:p>
@@ -17784,7 +17785,7 @@
             <a:fld id="{EE64089C-D369-469E-B8EF-DA981A30B6A9}" type="datetimeFigureOut">
               <a:rPr lang="en-US" smtClean="0"/>
               <a:pPr/>
-              <a:t>7/7/2013</a:t>
+              <a:t>7/12/2013</a:t>
             </a:fld>
             <a:endParaRPr lang="en-US"/>
           </a:p>
@@ -17914,7 +17915,7 @@
             <a:fld id="{C2790490-4DC2-4FEE-BE9B-51BF698CE1BA}" type="datetimeFigureOut">
               <a:rPr lang="en-US" smtClean="0"/>
               <a:pPr/>
-              <a:t>7/7/2013</a:t>
+              <a:t>7/12/2013</a:t>
             </a:fld>
             <a:endParaRPr lang="en-US"/>
           </a:p>
@@ -18021,7 +18022,7 @@
             <a:fld id="{967AFAAB-E4A3-4D2D-9698-ACFAEF667015}" type="datetimeFigureOut">
               <a:rPr lang="en-US" smtClean="0"/>
               <a:pPr/>
-              <a:t>7/7/2013</a:t>
+              <a:t>7/12/2013</a:t>
             </a:fld>
             <a:endParaRPr lang="en-US"/>
           </a:p>
@@ -18314,7 +18315,7 @@
                 </a:solidFill>
               </a:rPr>
               <a:pPr/>
-              <a:t>7/7/2013</a:t>
+              <a:t>7/12/2013</a:t>
             </a:fld>
             <a:endParaRPr lang="en-US">
               <a:solidFill>
@@ -18587,7 +18588,7 @@
                 </a:solidFill>
               </a:rPr>
               <a:pPr/>
-              <a:t>7/7/2013</a:t>
+              <a:t>7/12/2013</a:t>
             </a:fld>
             <a:endParaRPr lang="en-US">
               <a:solidFill>
@@ -18820,7 +18821,7 @@
                 </a:solidFill>
               </a:rPr>
               <a:pPr/>
-              <a:t>7/7/2013</a:t>
+              <a:t>7/12/2013</a:t>
             </a:fld>
             <a:endParaRPr lang="en-US" dirty="0">
               <a:solidFill>
@@ -19656,14 +19657,14 @@
             <p:ph idx="1"/>
             <p:extLst>
               <p:ext uri="{D42A27DB-BD31-4B8C-83A1-F6EECF244321}">
-                <p14:modId xmlns:p14="http://schemas.microsoft.com/office/powerpoint/2010/main" val="2457069553"/>
+                <p14:modId xmlns:p14="http://schemas.microsoft.com/office/powerpoint/2010/main" val="1278436992"/>
               </p:ext>
             </p:extLst>
           </p:nvPr>
         </p:nvGraphicFramePr>
         <p:xfrm>
-          <a:off x="457200" y="1600200"/>
-          <a:ext cx="8229600" cy="4525963"/>
+          <a:off x="457200" y="655637"/>
+          <a:ext cx="8229600" cy="3763963"/>
         </p:xfrm>
         <a:graphic>
           <a:graphicData uri="http://schemas.openxmlformats.org/drawingml/2006/diagram">
@@ -19671,10 +19672,34 @@
           </a:graphicData>
         </a:graphic>
       </p:graphicFrame>
+      <p:pic>
+        <p:nvPicPr>
+          <p:cNvPr id="3" name="Picture 2"/>
+          <p:cNvPicPr>
+            <a:picLocks noChangeAspect="1"/>
+          </p:cNvPicPr>
+          <p:nvPr/>
+        </p:nvPicPr>
+        <p:blipFill>
+          <a:blip r:embed="rId7"/>
+          <a:stretch>
+            <a:fillRect/>
+          </a:stretch>
+        </p:blipFill>
+        <p:spPr>
+          <a:xfrm>
+            <a:off x="304751" y="3733800"/>
+            <a:ext cx="8534497" cy="2833687"/>
+          </a:xfrm>
+          <a:prstGeom prst="rect">
+            <a:avLst/>
+          </a:prstGeom>
+        </p:spPr>
+      </p:pic>
     </p:spTree>
     <p:extLst>
       <p:ext uri="{BB962C8B-B14F-4D97-AF65-F5344CB8AC3E}">
-        <p14:creationId xmlns:p14="http://schemas.microsoft.com/office/powerpoint/2010/main" val="2780786447"/>
+        <p14:creationId xmlns:p14="http://schemas.microsoft.com/office/powerpoint/2010/main" val="3667383013"/>
       </p:ext>
     </p:extLst>
   </p:cSld>
@@ -19801,6 +19826,73 @@
           <a:chExt cx="0" cy="0"/>
         </a:xfrm>
       </p:grpSpPr>
+      <p:sp>
+        <p:nvSpPr>
+          <p:cNvPr id="2" name="Title 1"/>
+          <p:cNvSpPr>
+            <a:spLocks noGrp="1"/>
+          </p:cNvSpPr>
+          <p:nvPr>
+            <p:ph type="ctrTitle"/>
+          </p:nvPr>
+        </p:nvSpPr>
+        <p:spPr>
+          <a:xfrm>
+            <a:off x="457200" y="2590800"/>
+            <a:ext cx="8229600" cy="1143000"/>
+          </a:xfrm>
+        </p:spPr>
+        <p:txBody>
+          <a:bodyPr>
+            <a:normAutofit/>
+          </a:bodyPr>
+          <a:lstStyle/>
+          <a:p>
+            <a:r>
+              <a:rPr lang="en-US" smtClean="0"/>
+              <a:t>Let’s code!</a:t>
+            </a:r>
+            <a:endParaRPr lang="en-US" dirty="0"/>
+          </a:p>
+        </p:txBody>
+      </p:sp>
+    </p:spTree>
+    <p:extLst>
+      <p:ext uri="{BB962C8B-B14F-4D97-AF65-F5344CB8AC3E}">
+        <p14:creationId xmlns:p14="http://schemas.microsoft.com/office/powerpoint/2010/main" val="3308583023"/>
+      </p:ext>
+    </p:extLst>
+  </p:cSld>
+  <p:clrMapOvr>
+    <a:masterClrMapping/>
+  </p:clrMapOvr>
+  <p:timing>
+    <p:tnLst>
+      <p:par>
+        <p:cTn id="1" dur="indefinite" restart="never" nodeType="tmRoot"/>
+      </p:par>
+    </p:tnLst>
+  </p:timing>
+</p:sld>
+</file>
+
+<file path=ppt/slides/slide16.xml><?xml version="1.0" encoding="utf-8"?>
+<p:sld xmlns:a="http://schemas.openxmlformats.org/drawingml/2006/main" xmlns:r="http://schemas.openxmlformats.org/officeDocument/2006/relationships" xmlns:p="http://schemas.openxmlformats.org/presentationml/2006/main" show="0">
+  <p:cSld>
+    <p:spTree>
+      <p:nvGrpSpPr>
+        <p:cNvPr id="1" name=""/>
+        <p:cNvGrpSpPr/>
+        <p:nvPr/>
+      </p:nvGrpSpPr>
+      <p:grpSpPr>
+        <a:xfrm>
+          <a:off x="0" y="0"/>
+          <a:ext cx="0" cy="0"/>
+          <a:chOff x="0" y="0"/>
+          <a:chExt cx="0" cy="0"/>
+        </a:xfrm>
+      </p:grpSpPr>
       <p:pic>
         <p:nvPicPr>
           <p:cNvPr id="4" name="Content Placeholder 3"/>
@@ -19837,10 +19929,25 @@
   <p:clrMapOvr>
     <a:masterClrMapping/>
   </p:clrMapOvr>
+  <mc:AlternateContent xmlns:mc="http://schemas.openxmlformats.org/markup-compatibility/2006">
+    <mc:Choice xmlns:p14="http://schemas.microsoft.com/office/powerpoint/2010/main" Requires="p14">
+      <p:transition spd="slow" p14:dur="2000"/>
+    </mc:Choice>
+    <mc:Fallback>
+      <p:transition spd="slow"/>
+    </mc:Fallback>
+  </mc:AlternateContent>
+  <p:timing>
+    <p:tnLst>
+      <p:par>
+        <p:cTn id="1" dur="indefinite" restart="never" nodeType="tmRoot"/>
+      </p:par>
+    </p:tnLst>
+  </p:timing>
 </p:sld>
 </file>
 
-<file path=ppt/slides/slide16.xml><?xml version="1.0" encoding="utf-8"?>
+<file path=ppt/slides/slide17.xml><?xml version="1.0" encoding="utf-8"?>
 <p:sld xmlns:a="http://schemas.openxmlformats.org/drawingml/2006/main" xmlns:r="http://schemas.openxmlformats.org/officeDocument/2006/relationships" xmlns:p="http://schemas.openxmlformats.org/presentationml/2006/main">
   <p:cSld>
     <p:spTree>
@@ -20020,7 +20127,7 @@
 </p:sld>
 </file>
 
-<file path=ppt/slides/slide17.xml><?xml version="1.0" encoding="utf-8"?>
+<file path=ppt/slides/slide18.xml><?xml version="1.0" encoding="utf-8"?>
 <p:sld xmlns:a="http://schemas.openxmlformats.org/drawingml/2006/main" xmlns:r="http://schemas.openxmlformats.org/officeDocument/2006/relationships" xmlns:p="http://schemas.openxmlformats.org/presentationml/2006/main">
   <p:cSld>
     <p:spTree>
@@ -20337,14 +20444,21 @@
   <p:clrMapOvr>
     <a:masterClrMapping/>
   </p:clrMapOvr>
-  <mc:AlternateContent xmlns:mc="http://schemas.openxmlformats.org/markup-compatibility/2006">
-    <mc:Choice xmlns:p14="http://schemas.microsoft.com/office/powerpoint/2010/main" Requires="p14">
+  <mc:AlternateContent xmlns:mc="http://schemas.openxmlformats.org/markup-compatibility/2006" xmlns:p14="http://schemas.microsoft.com/office/powerpoint/2010/main">
+    <mc:Choice Requires="p14">
       <p:transition spd="slow" p14:dur="2000"/>
     </mc:Choice>
-    <mc:Fallback>
+    <mc:Fallback xmlns="">
       <p:transition spd="slow"/>
     </mc:Fallback>
   </mc:AlternateContent>
+  <p:timing>
+    <p:tnLst>
+      <p:par>
+        <p:cTn id="1" dur="indefinite" restart="never" nodeType="tmRoot"/>
+      </p:par>
+    </p:tnLst>
+  </p:timing>
 </p:sld>
 </file>
 
@@ -20399,19 +20513,26 @@
   <p:clrMapOvr>
     <a:masterClrMapping/>
   </p:clrMapOvr>
-  <mc:AlternateContent xmlns:mc="http://schemas.openxmlformats.org/markup-compatibility/2006">
-    <mc:Choice xmlns:p14="http://schemas.microsoft.com/office/powerpoint/2010/main" Requires="p14">
+  <mc:AlternateContent xmlns:mc="http://schemas.openxmlformats.org/markup-compatibility/2006" xmlns:p14="http://schemas.microsoft.com/office/powerpoint/2010/main">
+    <mc:Choice Requires="p14">
       <p:transition spd="slow" p14:dur="2000"/>
     </mc:Choice>
-    <mc:Fallback>
+    <mc:Fallback xmlns="">
       <p:transition spd="slow"/>
     </mc:Fallback>
   </mc:AlternateContent>
+  <p:timing>
+    <p:tnLst>
+      <p:par>
+        <p:cTn id="1" dur="indefinite" restart="never" nodeType="tmRoot"/>
+      </p:par>
+    </p:tnLst>
+  </p:timing>
 </p:sld>
 </file>
 
 <file path=ppt/slides/slide6.xml><?xml version="1.0" encoding="utf-8"?>
-<p:sld xmlns:a="http://schemas.openxmlformats.org/drawingml/2006/main" xmlns:r="http://schemas.openxmlformats.org/officeDocument/2006/relationships" xmlns:p="http://schemas.openxmlformats.org/presentationml/2006/main">
+<p:sld xmlns:a="http://schemas.openxmlformats.org/drawingml/2006/main" xmlns:r="http://schemas.openxmlformats.org/officeDocument/2006/relationships" xmlns:p="http://schemas.openxmlformats.org/presentationml/2006/main" show="0">
   <p:cSld>
     <p:spTree>
       <p:nvGrpSpPr>
@@ -20494,6 +20615,14 @@
   <p:clrMapOvr>
     <a:masterClrMapping/>
   </p:clrMapOvr>
+  <mc:AlternateContent xmlns:mc="http://schemas.openxmlformats.org/markup-compatibility/2006" xmlns:p14="http://schemas.microsoft.com/office/powerpoint/2010/main">
+    <mc:Choice Requires="p14">
+      <p:transition spd="slow" p14:dur="2000"/>
+    </mc:Choice>
+    <mc:Fallback xmlns="">
+      <p:transition spd="slow"/>
+    </mc:Fallback>
+  </mc:AlternateContent>
   <p:timing>
     <p:tnLst>
       <p:par>
@@ -20505,7 +20634,7 @@
 </file>
 
 <file path=ppt/slides/slide7.xml><?xml version="1.0" encoding="utf-8"?>
-<p:sld xmlns:a="http://schemas.openxmlformats.org/drawingml/2006/main" xmlns:r="http://schemas.openxmlformats.org/officeDocument/2006/relationships" xmlns:p="http://schemas.openxmlformats.org/presentationml/2006/main">
+<p:sld xmlns:a="http://schemas.openxmlformats.org/drawingml/2006/main" xmlns:r="http://schemas.openxmlformats.org/officeDocument/2006/relationships" xmlns:p="http://schemas.openxmlformats.org/presentationml/2006/main" show="0">
   <p:cSld>
     <p:spTree>
       <p:nvGrpSpPr>
@@ -20588,6 +20717,14 @@
   <p:clrMapOvr>
     <a:masterClrMapping/>
   </p:clrMapOvr>
+  <mc:AlternateContent xmlns:mc="http://schemas.openxmlformats.org/markup-compatibility/2006" xmlns:p14="http://schemas.microsoft.com/office/powerpoint/2010/main">
+    <mc:Choice Requires="p14">
+      <p:transition spd="slow" p14:dur="2000"/>
+    </mc:Choice>
+    <mc:Fallback xmlns="">
+      <p:transition spd="slow"/>
+    </mc:Fallback>
+  </mc:AlternateContent>
   <p:timing>
     <p:tnLst>
       <p:par>

</xml_diff>